<commit_message>
Add presentation for FloPy exercise
*Update to api presentation
</commit_message>
<xml_diff>
--- a/presentations/5-MODFLOW_API.pptx
+++ b/presentations/5-MODFLOW_API.pptx
@@ -4328,7 +4328,7 @@
           <a:noFill/>
           <a:extLst>
             <a:ext uri="{909E8E84-426E-40dd-AFC4-6F175D3DCCD1}">
-              <a14:hiddenFill xmlns="" xmlns:a14="http://schemas.microsoft.com/office/drawing/2010/main">
+              <a14:hiddenFill xmlns:a14="http://schemas.microsoft.com/office/drawing/2010/main" xmlns="">
                 <a:solidFill>
                   <a:srgbClr val="FFFFFF"/>
                 </a:solidFill>
@@ -5044,8 +5044,13 @@
           <a:p>
             <a:r>
               <a:rPr lang="nl-NL" dirty="0"/>
-              <a:t>MODFLOW API</a:t>
-            </a:r>
+              <a:t>MODFLOW API </a:t>
+            </a:r>
+            <a:r>
+              <a:rPr lang="nl-NL" dirty="0" err="1"/>
+              <a:t>exercise</a:t>
+            </a:r>
+            <a:endParaRPr lang="nl-NL" dirty="0"/>
           </a:p>
         </p:txBody>
       </p:sp>

</xml_diff>